<commit_message>
MBD+Agile(Escalator) Gantt+Github 이미지 추가
</commit_message>
<xml_diff>
--- a/static/assets/1_process_img.pptx
+++ b/static/assets/1_process_img.pptx
@@ -6,11 +6,12 @@
     <p:sldMasterId id="2147483660" r:id="rId2"/>
   </p:sldMasterIdLst>
   <p:notesMasterIdLst>
-    <p:notesMasterId r:id="rId5"/>
+    <p:notesMasterId r:id="rId6"/>
   </p:notesMasterIdLst>
   <p:sldIdLst>
     <p:sldId id="358" r:id="rId3"/>
     <p:sldId id="359" r:id="rId4"/>
+    <p:sldId id="360" r:id="rId5"/>
   </p:sldIdLst>
   <p:sldSz cx="18288000" cy="14039850"/>
   <p:notesSz cx="6858000" cy="9144000"/>
@@ -111,18 +112,7 @@
   </p:defaultTextStyle>
   <p:extLst>
     <p:ext uri="{EFAFB233-063F-42B5-8137-9DF3F51BA10A}">
-      <p15:sldGuideLst xmlns:p15="http://schemas.microsoft.com/office/powerpoint/2012/main">
-        <p15:guide id="3" pos="317" userDrawn="1">
-          <p15:clr>
-            <a:srgbClr val="A4A3A4"/>
-          </p15:clr>
-        </p15:guide>
-        <p15:guide id="4" orient="horz" pos="4422">
-          <p15:clr>
-            <a:srgbClr val="A4A3A4"/>
-          </p15:clr>
-        </p15:guide>
-      </p15:sldGuideLst>
+      <p15:sldGuideLst xmlns:p15="http://schemas.microsoft.com/office/powerpoint/2012/main"/>
     </p:ext>
     <p:ext uri="{2D200454-40CA-4A62-9FC3-DE9A4176ACB9}">
       <p15:notesGuideLst xmlns:p15="http://schemas.microsoft.com/office/powerpoint/2012/main"/>
@@ -213,7 +203,7 @@
           <a:p>
             <a:fld id="{CABFA58B-201B-41D2-AA3E-28483B84FD7B}" type="datetimeFigureOut">
               <a:rPr lang="ko-KR" altLang="en-US" smtClean="0"/>
-              <a:t>2022-11-27</a:t>
+              <a:t>2022-11-30</a:t>
             </a:fld>
             <a:endParaRPr lang="ko-KR" altLang="en-US"/>
           </a:p>
@@ -659,7 +649,7 @@
           <a:p>
             <a:fld id="{C33163C4-65CF-48D2-8124-E2CEDBD7A0C5}" type="datetimeFigureOut">
               <a:rPr lang="ko-KR" altLang="en-US" smtClean="0"/>
-              <a:t>2022-11-27</a:t>
+              <a:t>2022-11-30</a:t>
             </a:fld>
             <a:endParaRPr lang="ko-KR" altLang="en-US"/>
           </a:p>
@@ -981,7 +971,7 @@
           <a:p>
             <a:fld id="{C33163C4-65CF-48D2-8124-E2CEDBD7A0C5}" type="datetimeFigureOut">
               <a:rPr lang="ko-KR" altLang="en-US" smtClean="0"/>
-              <a:t>2022-11-27</a:t>
+              <a:t>2022-11-30</a:t>
             </a:fld>
             <a:endParaRPr lang="ko-KR" altLang="en-US"/>
           </a:p>
@@ -1159,7 +1149,7 @@
           <a:p>
             <a:fld id="{C33163C4-65CF-48D2-8124-E2CEDBD7A0C5}" type="datetimeFigureOut">
               <a:rPr lang="ko-KR" altLang="en-US" smtClean="0"/>
-              <a:t>2022-11-27</a:t>
+              <a:t>2022-11-30</a:t>
             </a:fld>
             <a:endParaRPr lang="ko-KR" altLang="en-US"/>
           </a:p>
@@ -1399,7 +1389,7 @@
           <a:p>
             <a:fld id="{29936F60-83FB-4643-B7D2-F169DF4090A4}" type="datetimeFigureOut">
               <a:rPr lang="ko-KR" altLang="en-US" smtClean="0"/>
-              <a:t>2022-11-27</a:t>
+              <a:t>2022-11-30</a:t>
             </a:fld>
             <a:endParaRPr lang="ko-KR" altLang="en-US"/>
           </a:p>
@@ -1567,7 +1557,7 @@
           <a:p>
             <a:fld id="{29936F60-83FB-4643-B7D2-F169DF4090A4}" type="datetimeFigureOut">
               <a:rPr lang="ko-KR" altLang="en-US" smtClean="0"/>
-              <a:t>2022-11-27</a:t>
+              <a:t>2022-11-30</a:t>
             </a:fld>
             <a:endParaRPr lang="ko-KR" altLang="en-US"/>
           </a:p>
@@ -1812,7 +1802,7 @@
           <a:p>
             <a:fld id="{29936F60-83FB-4643-B7D2-F169DF4090A4}" type="datetimeFigureOut">
               <a:rPr lang="ko-KR" altLang="en-US" smtClean="0"/>
-              <a:t>2022-11-27</a:t>
+              <a:t>2022-11-30</a:t>
             </a:fld>
             <a:endParaRPr lang="ko-KR" altLang="en-US"/>
           </a:p>
@@ -2097,7 +2087,7 @@
           <a:p>
             <a:fld id="{29936F60-83FB-4643-B7D2-F169DF4090A4}" type="datetimeFigureOut">
               <a:rPr lang="ko-KR" altLang="en-US" smtClean="0"/>
-              <a:t>2022-11-27</a:t>
+              <a:t>2022-11-30</a:t>
             </a:fld>
             <a:endParaRPr lang="ko-KR" altLang="en-US"/>
           </a:p>
@@ -2516,7 +2506,7 @@
           <a:p>
             <a:fld id="{29936F60-83FB-4643-B7D2-F169DF4090A4}" type="datetimeFigureOut">
               <a:rPr lang="ko-KR" altLang="en-US" smtClean="0"/>
-              <a:t>2022-11-27</a:t>
+              <a:t>2022-11-30</a:t>
             </a:fld>
             <a:endParaRPr lang="ko-KR" altLang="en-US"/>
           </a:p>
@@ -2633,7 +2623,7 @@
           <a:p>
             <a:fld id="{29936F60-83FB-4643-B7D2-F169DF4090A4}" type="datetimeFigureOut">
               <a:rPr lang="ko-KR" altLang="en-US" smtClean="0"/>
-              <a:t>2022-11-27</a:t>
+              <a:t>2022-11-30</a:t>
             </a:fld>
             <a:endParaRPr lang="ko-KR" altLang="en-US"/>
           </a:p>
@@ -2728,7 +2718,7 @@
           <a:p>
             <a:fld id="{29936F60-83FB-4643-B7D2-F169DF4090A4}" type="datetimeFigureOut">
               <a:rPr lang="ko-KR" altLang="en-US" smtClean="0"/>
-              <a:t>2022-11-27</a:t>
+              <a:t>2022-11-30</a:t>
             </a:fld>
             <a:endParaRPr lang="ko-KR" altLang="en-US"/>
           </a:p>
@@ -3003,7 +2993,7 @@
           <a:p>
             <a:fld id="{29936F60-83FB-4643-B7D2-F169DF4090A4}" type="datetimeFigureOut">
               <a:rPr lang="ko-KR" altLang="en-US" smtClean="0"/>
-              <a:t>2022-11-27</a:t>
+              <a:t>2022-11-30</a:t>
             </a:fld>
             <a:endParaRPr lang="ko-KR" altLang="en-US"/>
           </a:p>
@@ -3193,7 +3183,7 @@
           <a:p>
             <a:fld id="{C33163C4-65CF-48D2-8124-E2CEDBD7A0C5}" type="datetimeFigureOut">
               <a:rPr lang="ko-KR" altLang="en-US" smtClean="0"/>
-              <a:t>2022-11-27</a:t>
+              <a:t>2022-11-30</a:t>
             </a:fld>
             <a:endParaRPr lang="ko-KR" altLang="en-US"/>
           </a:p>
@@ -3806,7 +3796,7 @@
           <a:p>
             <a:fld id="{29936F60-83FB-4643-B7D2-F169DF4090A4}" type="datetimeFigureOut">
               <a:rPr lang="ko-KR" altLang="en-US" smtClean="0"/>
-              <a:t>2022-11-27</a:t>
+              <a:t>2022-11-30</a:t>
             </a:fld>
             <a:endParaRPr lang="ko-KR" altLang="en-US"/>
           </a:p>
@@ -3974,7 +3964,7 @@
           <a:p>
             <a:fld id="{29936F60-83FB-4643-B7D2-F169DF4090A4}" type="datetimeFigureOut">
               <a:rPr lang="ko-KR" altLang="en-US" smtClean="0"/>
-              <a:t>2022-11-27</a:t>
+              <a:t>2022-11-30</a:t>
             </a:fld>
             <a:endParaRPr lang="ko-KR" altLang="en-US"/>
           </a:p>
@@ -4152,7 +4142,7 @@
           <a:p>
             <a:fld id="{29936F60-83FB-4643-B7D2-F169DF4090A4}" type="datetimeFigureOut">
               <a:rPr lang="ko-KR" altLang="en-US" smtClean="0"/>
-              <a:t>2022-11-27</a:t>
+              <a:t>2022-11-30</a:t>
             </a:fld>
             <a:endParaRPr lang="ko-KR" altLang="en-US"/>
           </a:p>
@@ -4397,7 +4387,7 @@
           <a:p>
             <a:fld id="{C33163C4-65CF-48D2-8124-E2CEDBD7A0C5}" type="datetimeFigureOut">
               <a:rPr lang="ko-KR" altLang="en-US" smtClean="0"/>
-              <a:t>2022-11-27</a:t>
+              <a:t>2022-11-30</a:t>
             </a:fld>
             <a:endParaRPr lang="ko-KR" altLang="en-US"/>
           </a:p>
@@ -4523,7 +4513,7 @@
           <a:p>
             <a:fld id="{C33163C4-65CF-48D2-8124-E2CEDBD7A0C5}" type="datetimeFigureOut">
               <a:rPr lang="ko-KR" altLang="en-US" smtClean="0"/>
-              <a:t>2022-11-27</a:t>
+              <a:t>2022-11-30</a:t>
             </a:fld>
             <a:endParaRPr lang="ko-KR" altLang="en-US"/>
           </a:p>
@@ -5426,7 +5416,7 @@
           <a:p>
             <a:fld id="{C33163C4-65CF-48D2-8124-E2CEDBD7A0C5}" type="datetimeFigureOut">
               <a:rPr lang="ko-KR" altLang="en-US" smtClean="0"/>
-              <a:t>2022-11-27</a:t>
+              <a:t>2022-11-30</a:t>
             </a:fld>
             <a:endParaRPr lang="ko-KR" altLang="en-US"/>
           </a:p>
@@ -5543,7 +5533,7 @@
           <a:p>
             <a:fld id="{C33163C4-65CF-48D2-8124-E2CEDBD7A0C5}" type="datetimeFigureOut">
               <a:rPr lang="ko-KR" altLang="en-US" smtClean="0"/>
-              <a:t>2022-11-27</a:t>
+              <a:t>2022-11-30</a:t>
             </a:fld>
             <a:endParaRPr lang="ko-KR" altLang="en-US"/>
           </a:p>
@@ -5638,7 +5628,7 @@
           <a:p>
             <a:fld id="{C33163C4-65CF-48D2-8124-E2CEDBD7A0C5}" type="datetimeFigureOut">
               <a:rPr lang="ko-KR" altLang="en-US" smtClean="0"/>
-              <a:t>2022-11-27</a:t>
+              <a:t>2022-11-30</a:t>
             </a:fld>
             <a:endParaRPr lang="ko-KR" altLang="en-US"/>
           </a:p>
@@ -5913,7 +5903,7 @@
           <a:p>
             <a:fld id="{C33163C4-65CF-48D2-8124-E2CEDBD7A0C5}" type="datetimeFigureOut">
               <a:rPr lang="ko-KR" altLang="en-US" smtClean="0"/>
-              <a:t>2022-11-27</a:t>
+              <a:t>2022-11-30</a:t>
             </a:fld>
             <a:endParaRPr lang="ko-KR" altLang="en-US"/>
           </a:p>
@@ -6165,7 +6155,7 @@
           <a:p>
             <a:fld id="{C33163C4-65CF-48D2-8124-E2CEDBD7A0C5}" type="datetimeFigureOut">
               <a:rPr lang="ko-KR" altLang="en-US" smtClean="0"/>
-              <a:t>2022-11-27</a:t>
+              <a:t>2022-11-30</a:t>
             </a:fld>
             <a:endParaRPr lang="ko-KR" altLang="en-US"/>
           </a:p>
@@ -6400,7 +6390,7 @@
           <a:p>
             <a:fld id="{C33163C4-65CF-48D2-8124-E2CEDBD7A0C5}" type="datetimeFigureOut">
               <a:rPr lang="ko-KR" altLang="en-US" smtClean="0"/>
-              <a:t>2022-11-27</a:t>
+              <a:t>2022-11-30</a:t>
             </a:fld>
             <a:endParaRPr lang="ko-KR" altLang="en-US"/>
           </a:p>
@@ -6910,7 +6900,7 @@
           <a:p>
             <a:fld id="{29936F60-83FB-4643-B7D2-F169DF4090A4}" type="datetimeFigureOut">
               <a:rPr lang="ko-KR" altLang="en-US" smtClean="0"/>
-              <a:t>2022-11-27</a:t>
+              <a:t>2022-11-30</a:t>
             </a:fld>
             <a:endParaRPr lang="ko-KR" altLang="en-US"/>
           </a:p>
@@ -8982,6 +8972,703 @@
     <p:extLst>
       <p:ext uri="{BB962C8B-B14F-4D97-AF65-F5344CB8AC3E}">
         <p14:creationId xmlns:p14="http://schemas.microsoft.com/office/powerpoint/2010/main" val="2596662696"/>
+      </p:ext>
+    </p:extLst>
+  </p:cSld>
+  <p:clrMapOvr>
+    <a:masterClrMapping/>
+  </p:clrMapOvr>
+</p:sld>
+</file>
+
+<file path=ppt/slides/slide3.xml><?xml version="1.0" encoding="utf-8"?>
+<p:sld xmlns:a="http://schemas.openxmlformats.org/drawingml/2006/main" xmlns:r="http://schemas.openxmlformats.org/officeDocument/2006/relationships" xmlns:p="http://schemas.openxmlformats.org/presentationml/2006/main">
+  <p:cSld>
+    <p:spTree>
+      <p:nvGrpSpPr>
+        <p:cNvPr id="1" name=""/>
+        <p:cNvGrpSpPr/>
+        <p:nvPr/>
+      </p:nvGrpSpPr>
+      <p:grpSpPr>
+        <a:xfrm>
+          <a:off x="0" y="0"/>
+          <a:ext cx="0" cy="0"/>
+          <a:chOff x="0" y="0"/>
+          <a:chExt cx="0" cy="0"/>
+        </a:xfrm>
+      </p:grpSpPr>
+      <p:sp>
+        <p:nvSpPr>
+          <p:cNvPr id="3" name="슬라이드 번호 개체 틀 2"/>
+          <p:cNvSpPr>
+            <a:spLocks noGrp="1"/>
+          </p:cNvSpPr>
+          <p:nvPr>
+            <p:ph type="sldNum" sz="quarter" idx="12"/>
+          </p:nvPr>
+        </p:nvSpPr>
+        <p:spPr/>
+        <p:txBody>
+          <a:bodyPr/>
+          <a:lstStyle/>
+          <a:p>
+            <a:fld id="{83FD6675-1775-473F-B12B-1A4033AC630B}" type="slidenum">
+              <a:rPr lang="ko-KR" altLang="en-US" smtClean="0"/>
+              <a:t>3</a:t>
+            </a:fld>
+            <a:endParaRPr lang="ko-KR" altLang="en-US"/>
+          </a:p>
+        </p:txBody>
+      </p:sp>
+      <p:sp>
+        <p:nvSpPr>
+          <p:cNvPr id="4" name="제목 3"/>
+          <p:cNvSpPr>
+            <a:spLocks noGrp="1"/>
+          </p:cNvSpPr>
+          <p:nvPr>
+            <p:ph type="title"/>
+          </p:nvPr>
+        </p:nvSpPr>
+        <p:spPr/>
+        <p:txBody>
+          <a:bodyPr/>
+          <a:lstStyle/>
+          <a:p>
+            <a:endParaRPr lang="ko-KR" altLang="en-US"/>
+          </a:p>
+        </p:txBody>
+      </p:sp>
+      <p:pic>
+        <p:nvPicPr>
+          <p:cNvPr id="5" name="그림 4"/>
+          <p:cNvPicPr>
+            <a:picLocks noChangeAspect="1"/>
+          </p:cNvPicPr>
+          <p:nvPr/>
+        </p:nvPicPr>
+        <p:blipFill>
+          <a:blip r:embed="rId2">
+            <a:extLst>
+              <a:ext uri="{28A0092B-C50C-407E-A947-70E740481C1C}">
+                <a14:useLocalDpi xmlns:a14="http://schemas.microsoft.com/office/drawing/2010/main" val="0"/>
+              </a:ext>
+            </a:extLst>
+          </a:blip>
+          <a:stretch>
+            <a:fillRect/>
+          </a:stretch>
+        </p:blipFill>
+        <p:spPr>
+          <a:xfrm>
+            <a:off x="508382" y="1880470"/>
+            <a:ext cx="17271235" cy="10278909"/>
+          </a:xfrm>
+          <a:prstGeom prst="rect">
+            <a:avLst/>
+          </a:prstGeom>
+        </p:spPr>
+      </p:pic>
+      <p:pic>
+        <p:nvPicPr>
+          <p:cNvPr id="6" name="그림 5"/>
+          <p:cNvPicPr>
+            <a:picLocks noChangeAspect="1"/>
+          </p:cNvPicPr>
+          <p:nvPr/>
+        </p:nvPicPr>
+        <p:blipFill>
+          <a:blip r:embed="rId3">
+            <a:extLst>
+              <a:ext uri="{28A0092B-C50C-407E-A947-70E740481C1C}">
+                <a14:useLocalDpi xmlns:a14="http://schemas.microsoft.com/office/drawing/2010/main" val="0"/>
+              </a:ext>
+            </a:extLst>
+          </a:blip>
+          <a:stretch>
+            <a:fillRect/>
+          </a:stretch>
+        </p:blipFill>
+        <p:spPr>
+          <a:xfrm>
+            <a:off x="10521950" y="2915729"/>
+            <a:ext cx="7066643" cy="6444716"/>
+          </a:xfrm>
+          <a:prstGeom prst="rect">
+            <a:avLst/>
+          </a:prstGeom>
+          <a:ln w="63500">
+            <a:solidFill>
+              <a:srgbClr val="C00000"/>
+            </a:solidFill>
+          </a:ln>
+        </p:spPr>
+      </p:pic>
+      <p:sp>
+        <p:nvSpPr>
+          <p:cNvPr id="7" name="직사각형 6"/>
+          <p:cNvSpPr/>
+          <p:nvPr/>
+        </p:nvSpPr>
+        <p:spPr>
+          <a:xfrm>
+            <a:off x="791072" y="11088377"/>
+            <a:ext cx="1008112" cy="324036"/>
+          </a:xfrm>
+          <a:prstGeom prst="rect">
+            <a:avLst/>
+          </a:prstGeom>
+          <a:noFill/>
+          <a:ln>
+            <a:solidFill>
+              <a:srgbClr val="C00000"/>
+            </a:solidFill>
+          </a:ln>
+        </p:spPr>
+        <p:style>
+          <a:lnRef idx="2">
+            <a:schemeClr val="accent1">
+              <a:shade val="50000"/>
+            </a:schemeClr>
+          </a:lnRef>
+          <a:fillRef idx="1">
+            <a:schemeClr val="accent1"/>
+          </a:fillRef>
+          <a:effectRef idx="0">
+            <a:schemeClr val="accent1"/>
+          </a:effectRef>
+          <a:fontRef idx="minor">
+            <a:schemeClr val="lt1"/>
+          </a:fontRef>
+        </p:style>
+        <p:txBody>
+          <a:bodyPr rtlCol="0" anchor="ctr"/>
+          <a:lstStyle/>
+          <a:p>
+            <a:pPr algn="ctr"/>
+            <a:endParaRPr lang="ko-KR" altLang="en-US"/>
+          </a:p>
+        </p:txBody>
+      </p:sp>
+      <p:sp>
+        <p:nvSpPr>
+          <p:cNvPr id="8" name="직사각형 7"/>
+          <p:cNvSpPr/>
+          <p:nvPr/>
+        </p:nvSpPr>
+        <p:spPr>
+          <a:xfrm>
+            <a:off x="508381" y="11968786"/>
+            <a:ext cx="2872993" cy="185114"/>
+          </a:xfrm>
+          <a:prstGeom prst="rect">
+            <a:avLst/>
+          </a:prstGeom>
+          <a:noFill/>
+          <a:ln>
+            <a:solidFill>
+              <a:srgbClr val="C00000"/>
+            </a:solidFill>
+          </a:ln>
+        </p:spPr>
+        <p:style>
+          <a:lnRef idx="2">
+            <a:schemeClr val="accent1">
+              <a:shade val="50000"/>
+            </a:schemeClr>
+          </a:lnRef>
+          <a:fillRef idx="1">
+            <a:schemeClr val="accent1"/>
+          </a:fillRef>
+          <a:effectRef idx="0">
+            <a:schemeClr val="accent1"/>
+          </a:effectRef>
+          <a:fontRef idx="minor">
+            <a:schemeClr val="lt1"/>
+          </a:fontRef>
+        </p:style>
+        <p:txBody>
+          <a:bodyPr rtlCol="0" anchor="ctr"/>
+          <a:lstStyle/>
+          <a:p>
+            <a:pPr algn="ctr"/>
+            <a:endParaRPr lang="ko-KR" altLang="en-US"/>
+          </a:p>
+        </p:txBody>
+      </p:sp>
+      <p:sp>
+        <p:nvSpPr>
+          <p:cNvPr id="11" name="직사각형 10"/>
+          <p:cNvSpPr/>
+          <p:nvPr/>
+        </p:nvSpPr>
+        <p:spPr>
+          <a:xfrm>
+            <a:off x="1799184" y="2295525"/>
+            <a:ext cx="10081120" cy="152400"/>
+          </a:xfrm>
+          <a:prstGeom prst="rect">
+            <a:avLst/>
+          </a:prstGeom>
+          <a:solidFill>
+            <a:schemeClr val="tx1"/>
+          </a:solidFill>
+          <a:ln>
+            <a:noFill/>
+          </a:ln>
+        </p:spPr>
+        <p:style>
+          <a:lnRef idx="2">
+            <a:schemeClr val="accent1">
+              <a:shade val="50000"/>
+            </a:schemeClr>
+          </a:lnRef>
+          <a:fillRef idx="1">
+            <a:schemeClr val="accent1"/>
+          </a:fillRef>
+          <a:effectRef idx="0">
+            <a:schemeClr val="accent1"/>
+          </a:effectRef>
+          <a:fontRef idx="minor">
+            <a:schemeClr val="lt1"/>
+          </a:fontRef>
+        </p:style>
+        <p:txBody>
+          <a:bodyPr rtlCol="0" anchor="ctr"/>
+          <a:lstStyle/>
+          <a:p>
+            <a:pPr algn="ctr"/>
+            <a:endParaRPr lang="ko-KR" altLang="en-US"/>
+          </a:p>
+        </p:txBody>
+      </p:sp>
+      <p:sp>
+        <p:nvSpPr>
+          <p:cNvPr id="13" name="직사각형 12"/>
+          <p:cNvSpPr/>
+          <p:nvPr/>
+        </p:nvSpPr>
+        <p:spPr>
+          <a:xfrm>
+            <a:off x="646659" y="1952625"/>
+            <a:ext cx="1886991" cy="171450"/>
+          </a:xfrm>
+          <a:prstGeom prst="rect">
+            <a:avLst/>
+          </a:prstGeom>
+          <a:solidFill>
+            <a:schemeClr val="tx1"/>
+          </a:solidFill>
+          <a:ln>
+            <a:noFill/>
+          </a:ln>
+        </p:spPr>
+        <p:style>
+          <a:lnRef idx="2">
+            <a:schemeClr val="accent1">
+              <a:shade val="50000"/>
+            </a:schemeClr>
+          </a:lnRef>
+          <a:fillRef idx="1">
+            <a:schemeClr val="accent1"/>
+          </a:fillRef>
+          <a:effectRef idx="0">
+            <a:schemeClr val="accent1"/>
+          </a:effectRef>
+          <a:fontRef idx="minor">
+            <a:schemeClr val="lt1"/>
+          </a:fontRef>
+        </p:style>
+        <p:txBody>
+          <a:bodyPr rtlCol="0" anchor="ctr"/>
+          <a:lstStyle/>
+          <a:p>
+            <a:pPr algn="ctr"/>
+            <a:endParaRPr lang="ko-KR" altLang="en-US"/>
+          </a:p>
+        </p:txBody>
+      </p:sp>
+      <p:sp>
+        <p:nvSpPr>
+          <p:cNvPr id="14" name="직사각형 13"/>
+          <p:cNvSpPr/>
+          <p:nvPr/>
+        </p:nvSpPr>
+        <p:spPr>
+          <a:xfrm>
+            <a:off x="10575715" y="2971800"/>
+            <a:ext cx="1628986" cy="165100"/>
+          </a:xfrm>
+          <a:prstGeom prst="rect">
+            <a:avLst/>
+          </a:prstGeom>
+          <a:solidFill>
+            <a:schemeClr val="tx1"/>
+          </a:solidFill>
+          <a:ln>
+            <a:noFill/>
+          </a:ln>
+        </p:spPr>
+        <p:style>
+          <a:lnRef idx="2">
+            <a:schemeClr val="accent1">
+              <a:shade val="50000"/>
+            </a:schemeClr>
+          </a:lnRef>
+          <a:fillRef idx="1">
+            <a:schemeClr val="accent1"/>
+          </a:fillRef>
+          <a:effectRef idx="0">
+            <a:schemeClr val="accent1"/>
+          </a:effectRef>
+          <a:fontRef idx="minor">
+            <a:schemeClr val="lt1"/>
+          </a:fontRef>
+        </p:style>
+        <p:txBody>
+          <a:bodyPr rtlCol="0" anchor="ctr"/>
+          <a:lstStyle/>
+          <a:p>
+            <a:pPr algn="ctr"/>
+            <a:endParaRPr lang="ko-KR" altLang="en-US"/>
+          </a:p>
+        </p:txBody>
+      </p:sp>
+      <p:cxnSp>
+        <p:nvCxnSpPr>
+          <p:cNvPr id="16" name="직선 화살표 연결선 15"/>
+          <p:cNvCxnSpPr>
+            <a:stCxn id="7" idx="2"/>
+          </p:cNvCxnSpPr>
+          <p:nvPr/>
+        </p:nvCxnSpPr>
+        <p:spPr>
+          <a:xfrm>
+            <a:off x="1295128" y="11412413"/>
+            <a:ext cx="0" cy="556373"/>
+          </a:xfrm>
+          <a:prstGeom prst="straightConnector1">
+            <a:avLst/>
+          </a:prstGeom>
+          <a:noFill/>
+          <a:ln w="50800">
+            <a:solidFill>
+              <a:srgbClr val="C00000"/>
+            </a:solidFill>
+            <a:tailEnd type="triangle"/>
+          </a:ln>
+        </p:spPr>
+        <p:style>
+          <a:lnRef idx="2">
+            <a:schemeClr val="accent1">
+              <a:shade val="50000"/>
+            </a:schemeClr>
+          </a:lnRef>
+          <a:fillRef idx="1">
+            <a:schemeClr val="accent1"/>
+          </a:fillRef>
+          <a:effectRef idx="0">
+            <a:schemeClr val="accent1"/>
+          </a:effectRef>
+          <a:fontRef idx="minor">
+            <a:schemeClr val="lt1"/>
+          </a:fontRef>
+        </p:style>
+      </p:cxnSp>
+      <p:cxnSp>
+        <p:nvCxnSpPr>
+          <p:cNvPr id="18" name="꺾인 연결선 17"/>
+          <p:cNvCxnSpPr>
+            <a:stCxn id="31" idx="0"/>
+            <a:endCxn id="28" idx="2"/>
+          </p:cNvCxnSpPr>
+          <p:nvPr/>
+        </p:nvCxnSpPr>
+        <p:spPr>
+          <a:xfrm rot="5400000" flipH="1" flipV="1">
+            <a:off x="5975309" y="6262454"/>
+            <a:ext cx="2604830" cy="8800812"/>
+          </a:xfrm>
+          <a:prstGeom prst="bentConnector3">
+            <a:avLst>
+              <a:gd name="adj1" fmla="val 12981"/>
+            </a:avLst>
+          </a:prstGeom>
+          <a:noFill/>
+          <a:ln w="50800">
+            <a:solidFill>
+              <a:srgbClr val="C00000"/>
+            </a:solidFill>
+            <a:tailEnd type="triangle"/>
+          </a:ln>
+        </p:spPr>
+        <p:style>
+          <a:lnRef idx="2">
+            <a:schemeClr val="accent1">
+              <a:shade val="50000"/>
+            </a:schemeClr>
+          </a:lnRef>
+          <a:fillRef idx="1">
+            <a:schemeClr val="accent1"/>
+          </a:fillRef>
+          <a:effectRef idx="0">
+            <a:schemeClr val="accent1"/>
+          </a:effectRef>
+          <a:fontRef idx="minor">
+            <a:schemeClr val="lt1"/>
+          </a:fontRef>
+        </p:style>
+      </p:cxnSp>
+      <p:sp>
+        <p:nvSpPr>
+          <p:cNvPr id="24" name="TextBox 23"/>
+          <p:cNvSpPr txBox="1"/>
+          <p:nvPr/>
+        </p:nvSpPr>
+        <p:spPr>
+          <a:xfrm>
+            <a:off x="1837652" y="11166192"/>
+            <a:ext cx="1689723" cy="307777"/>
+          </a:xfrm>
+          <a:prstGeom prst="rect">
+            <a:avLst/>
+          </a:prstGeom>
+          <a:noFill/>
+        </p:spPr>
+        <p:txBody>
+          <a:bodyPr wrap="square" lIns="0" tIns="0" rIns="0" bIns="0" rtlCol="0">
+            <a:spAutoFit/>
+          </a:bodyPr>
+          <a:lstStyle/>
+          <a:p>
+            <a:pPr algn="ctr"/>
+            <a:r>
+              <a:rPr lang="ko-KR" altLang="en-US" sz="2000" b="1" smtClean="0">
+                <a:solidFill>
+                  <a:srgbClr val="C00000"/>
+                </a:solidFill>
+              </a:rPr>
+              <a:t>①이슈클릭 </a:t>
+            </a:r>
+            <a:r>
+              <a:rPr lang="ko-KR" altLang="en-US" sz="2000" b="1">
+                <a:solidFill>
+                  <a:srgbClr val="C00000"/>
+                </a:solidFill>
+              </a:rPr>
+              <a:t>시</a:t>
+            </a:r>
+            <a:endParaRPr lang="ko-KR" altLang="en-US" sz="2000" b="1" smtClean="0">
+              <a:solidFill>
+                <a:srgbClr val="C00000"/>
+              </a:solidFill>
+            </a:endParaRPr>
+          </a:p>
+        </p:txBody>
+      </p:sp>
+      <p:sp>
+        <p:nvSpPr>
+          <p:cNvPr id="25" name="TextBox 24"/>
+          <p:cNvSpPr txBox="1"/>
+          <p:nvPr/>
+        </p:nvSpPr>
+        <p:spPr>
+          <a:xfrm>
+            <a:off x="3668334" y="11683462"/>
+            <a:ext cx="2919381" cy="307777"/>
+          </a:xfrm>
+          <a:prstGeom prst="rect">
+            <a:avLst/>
+          </a:prstGeom>
+          <a:noFill/>
+        </p:spPr>
+        <p:txBody>
+          <a:bodyPr wrap="square" lIns="0" tIns="0" rIns="0" bIns="0" rtlCol="0">
+            <a:spAutoFit/>
+          </a:bodyPr>
+          <a:lstStyle/>
+          <a:p>
+            <a:pPr algn="ctr"/>
+            <a:r>
+              <a:rPr lang="ko-KR" altLang="en-US" sz="2000" b="1" smtClean="0">
+                <a:solidFill>
+                  <a:srgbClr val="C00000"/>
+                </a:solidFill>
+              </a:rPr>
+              <a:t>②링크된 </a:t>
+            </a:r>
+            <a:r>
+              <a:rPr lang="en-US" altLang="ko-KR" sz="2000" b="1">
+                <a:solidFill>
+                  <a:srgbClr val="C00000"/>
+                </a:solidFill>
+              </a:rPr>
+              <a:t>Github </a:t>
+            </a:r>
+            <a:r>
+              <a:rPr lang="ko-KR" altLang="en-US" sz="2000" b="1" smtClean="0">
+                <a:solidFill>
+                  <a:srgbClr val="C00000"/>
+                </a:solidFill>
+              </a:rPr>
+              <a:t>이슈를</a:t>
+            </a:r>
+            <a:endParaRPr lang="ko-KR" altLang="en-US" sz="2000" b="1" smtClean="0">
+              <a:solidFill>
+                <a:srgbClr val="C00000"/>
+              </a:solidFill>
+            </a:endParaRPr>
+          </a:p>
+        </p:txBody>
+      </p:sp>
+      <p:sp>
+        <p:nvSpPr>
+          <p:cNvPr id="26" name="TextBox 25"/>
+          <p:cNvSpPr txBox="1"/>
+          <p:nvPr/>
+        </p:nvSpPr>
+        <p:spPr>
+          <a:xfrm>
+            <a:off x="11880304" y="9432193"/>
+            <a:ext cx="3316283" cy="615553"/>
+          </a:xfrm>
+          <a:prstGeom prst="rect">
+            <a:avLst/>
+          </a:prstGeom>
+          <a:noFill/>
+        </p:spPr>
+        <p:txBody>
+          <a:bodyPr wrap="square" lIns="0" tIns="0" rIns="0" bIns="0" rtlCol="0">
+            <a:spAutoFit/>
+          </a:bodyPr>
+          <a:lstStyle/>
+          <a:p>
+            <a:pPr algn="ctr"/>
+            <a:r>
+              <a:rPr lang="ko-KR" altLang="en-US" sz="2000" b="1" smtClean="0">
+                <a:solidFill>
+                  <a:srgbClr val="C00000"/>
+                </a:solidFill>
+              </a:rPr>
+              <a:t>③ 새창에 열어 이슈상세를 </a:t>
+            </a:r>
+            <a:r>
+              <a:rPr lang="en-US" altLang="ko-KR" sz="2000" b="1" smtClean="0">
+                <a:solidFill>
+                  <a:srgbClr val="C00000"/>
+                </a:solidFill>
+              </a:rPr>
+              <a:t>OneClick</a:t>
+            </a:r>
+            <a:r>
+              <a:rPr lang="ko-KR" altLang="en-US" sz="2000" b="1" smtClean="0">
+                <a:solidFill>
+                  <a:srgbClr val="C00000"/>
+                </a:solidFill>
+              </a:rPr>
+              <a:t>으로 확인가능</a:t>
+            </a:r>
+            <a:endParaRPr lang="ko-KR" altLang="en-US" sz="2000" b="1" smtClean="0">
+              <a:solidFill>
+                <a:srgbClr val="C00000"/>
+              </a:solidFill>
+            </a:endParaRPr>
+          </a:p>
+        </p:txBody>
+      </p:sp>
+      <p:sp>
+        <p:nvSpPr>
+          <p:cNvPr id="28" name="직사각형 27"/>
+          <p:cNvSpPr/>
+          <p:nvPr/>
+        </p:nvSpPr>
+        <p:spPr>
+          <a:xfrm>
+            <a:off x="11174074" y="9036409"/>
+            <a:ext cx="1008112" cy="324036"/>
+          </a:xfrm>
+          <a:prstGeom prst="rect">
+            <a:avLst/>
+          </a:prstGeom>
+          <a:noFill/>
+          <a:ln>
+            <a:noFill/>
+          </a:ln>
+        </p:spPr>
+        <p:style>
+          <a:lnRef idx="2">
+            <a:schemeClr val="accent1">
+              <a:shade val="50000"/>
+            </a:schemeClr>
+          </a:lnRef>
+          <a:fillRef idx="1">
+            <a:schemeClr val="accent1"/>
+          </a:fillRef>
+          <a:effectRef idx="0">
+            <a:schemeClr val="accent1"/>
+          </a:effectRef>
+          <a:fontRef idx="minor">
+            <a:schemeClr val="lt1"/>
+          </a:fontRef>
+        </p:style>
+        <p:txBody>
+          <a:bodyPr rtlCol="0" anchor="ctr"/>
+          <a:lstStyle/>
+          <a:p>
+            <a:pPr algn="ctr"/>
+            <a:endParaRPr lang="ko-KR" altLang="en-US"/>
+          </a:p>
+        </p:txBody>
+      </p:sp>
+      <p:sp>
+        <p:nvSpPr>
+          <p:cNvPr id="31" name="직사각형 30"/>
+          <p:cNvSpPr/>
+          <p:nvPr/>
+        </p:nvSpPr>
+        <p:spPr>
+          <a:xfrm>
+            <a:off x="2373262" y="11965275"/>
+            <a:ext cx="1008112" cy="324036"/>
+          </a:xfrm>
+          <a:prstGeom prst="rect">
+            <a:avLst/>
+          </a:prstGeom>
+          <a:noFill/>
+          <a:ln>
+            <a:noFill/>
+          </a:ln>
+        </p:spPr>
+        <p:style>
+          <a:lnRef idx="2">
+            <a:schemeClr val="accent1">
+              <a:shade val="50000"/>
+            </a:schemeClr>
+          </a:lnRef>
+          <a:fillRef idx="1">
+            <a:schemeClr val="accent1"/>
+          </a:fillRef>
+          <a:effectRef idx="0">
+            <a:schemeClr val="accent1"/>
+          </a:effectRef>
+          <a:fontRef idx="minor">
+            <a:schemeClr val="lt1"/>
+          </a:fontRef>
+        </p:style>
+        <p:txBody>
+          <a:bodyPr rtlCol="0" anchor="ctr"/>
+          <a:lstStyle/>
+          <a:p>
+            <a:pPr algn="ctr"/>
+            <a:endParaRPr lang="ko-KR" altLang="en-US"/>
+          </a:p>
+        </p:txBody>
+      </p:sp>
+    </p:spTree>
+    <p:extLst>
+      <p:ext uri="{BB962C8B-B14F-4D97-AF65-F5344CB8AC3E}">
+        <p14:creationId xmlns:p14="http://schemas.microsoft.com/office/powerpoint/2010/main" val="81347763"/>
       </p:ext>
     </p:extLst>
   </p:cSld>

</xml_diff>